<commit_message>
Last commit. Good Job Team
</commit_message>
<xml_diff>
--- a/documents/Final Presentation.pptx
+++ b/documents/Final Presentation.pptx
@@ -123,6 +123,7 @@
 <p1510:revInfo xmlns:a="http://schemas.openxmlformats.org/drawingml/2006/main" xmlns:r="http://schemas.openxmlformats.org/officeDocument/2006/relationships" xmlns:p1510="http://schemas.microsoft.com/office/powerpoint/2015/10/main">
   <p1510:revLst>
     <p1510:client id="{04C0F8E9-9D0B-43AD-8E3E-44554E1EAA0A}" v="7" dt="2023-12-11T21:49:52.946"/>
+    <p1510:client id="{4BBDB205-D13D-4AF8-B43D-116461632D03}" v="4" dt="2023-12-12T18:57:33.900"/>
   </p1510:revLst>
 </p1510:revInfo>
 </file>
@@ -277,6 +278,75 @@
           <pc:docMk/>
           <pc:sldMk cId="3528882018" sldId="265"/>
         </pc:sldMkLst>
+      </pc:sldChg>
+    </pc:docChg>
+  </pc:docChgLst>
+  <pc:docChgLst>
+    <pc:chgData name="Bohan, Shaun M" userId="acaa2405-47ab-4b93-95cc-c6ce05832430" providerId="ADAL" clId="{4BBDB205-D13D-4AF8-B43D-116461632D03}"/>
+    <pc:docChg chg="custSel modSld">
+      <pc:chgData name="Bohan, Shaun M" userId="acaa2405-47ab-4b93-95cc-c6ce05832430" providerId="ADAL" clId="{4BBDB205-D13D-4AF8-B43D-116461632D03}" dt="2023-12-12T18:18:12.535" v="5" actId="478"/>
+      <pc:docMkLst>
+        <pc:docMk/>
+      </pc:docMkLst>
+      <pc:sldChg chg="delSp mod">
+        <pc:chgData name="Bohan, Shaun M" userId="acaa2405-47ab-4b93-95cc-c6ce05832430" providerId="ADAL" clId="{4BBDB205-D13D-4AF8-B43D-116461632D03}" dt="2023-12-12T18:17:02.234" v="0" actId="478"/>
+        <pc:sldMkLst>
+          <pc:docMk/>
+          <pc:sldMk cId="2910383325" sldId="256"/>
+        </pc:sldMkLst>
+        <pc:spChg chg="del">
+          <ac:chgData name="Bohan, Shaun M" userId="acaa2405-47ab-4b93-95cc-c6ce05832430" providerId="ADAL" clId="{4BBDB205-D13D-4AF8-B43D-116461632D03}" dt="2023-12-12T18:17:02.234" v="0" actId="478"/>
+          <ac:spMkLst>
+            <pc:docMk/>
+            <pc:sldMk cId="2910383325" sldId="256"/>
+            <ac:spMk id="3" creationId="{FA072AE6-A858-CD25-3EBF-D661A4880DA4}"/>
+          </ac:spMkLst>
+        </pc:spChg>
+      </pc:sldChg>
+      <pc:sldChg chg="modSp mod">
+        <pc:chgData name="Bohan, Shaun M" userId="acaa2405-47ab-4b93-95cc-c6ce05832430" providerId="ADAL" clId="{4BBDB205-D13D-4AF8-B43D-116461632D03}" dt="2023-12-12T18:17:32.017" v="1" actId="27107"/>
+        <pc:sldMkLst>
+          <pc:docMk/>
+          <pc:sldMk cId="3144042209" sldId="258"/>
+        </pc:sldMkLst>
+        <pc:graphicFrameChg chg="modGraphic">
+          <ac:chgData name="Bohan, Shaun M" userId="acaa2405-47ab-4b93-95cc-c6ce05832430" providerId="ADAL" clId="{4BBDB205-D13D-4AF8-B43D-116461632D03}" dt="2023-12-12T18:17:32.017" v="1" actId="27107"/>
+          <ac:graphicFrameMkLst>
+            <pc:docMk/>
+            <pc:sldMk cId="3144042209" sldId="258"/>
+            <ac:graphicFrameMk id="16" creationId="{BB6A3D8A-EC36-E9B4-6CDA-B29A0BEAE122}"/>
+          </ac:graphicFrameMkLst>
+        </pc:graphicFrameChg>
+      </pc:sldChg>
+      <pc:sldChg chg="delSp mod">
+        <pc:chgData name="Bohan, Shaun M" userId="acaa2405-47ab-4b93-95cc-c6ce05832430" providerId="ADAL" clId="{4BBDB205-D13D-4AF8-B43D-116461632D03}" dt="2023-12-12T18:18:12.535" v="5" actId="478"/>
+        <pc:sldMkLst>
+          <pc:docMk/>
+          <pc:sldMk cId="1829579952" sldId="260"/>
+        </pc:sldMkLst>
+        <pc:spChg chg="del">
+          <ac:chgData name="Bohan, Shaun M" userId="acaa2405-47ab-4b93-95cc-c6ce05832430" providerId="ADAL" clId="{4BBDB205-D13D-4AF8-B43D-116461632D03}" dt="2023-12-12T18:18:12.535" v="5" actId="478"/>
+          <ac:spMkLst>
+            <pc:docMk/>
+            <pc:sldMk cId="1829579952" sldId="260"/>
+            <ac:spMk id="3" creationId="{5BEC3A34-AAE7-F054-90D9-ECD1DACB384C}"/>
+          </ac:spMkLst>
+        </pc:spChg>
+      </pc:sldChg>
+      <pc:sldChg chg="modSp">
+        <pc:chgData name="Bohan, Shaun M" userId="acaa2405-47ab-4b93-95cc-c6ce05832430" providerId="ADAL" clId="{4BBDB205-D13D-4AF8-B43D-116461632D03}" dt="2023-12-12T18:18:01.774" v="4" actId="20577"/>
+        <pc:sldMkLst>
+          <pc:docMk/>
+          <pc:sldMk cId="2176736048" sldId="262"/>
+        </pc:sldMkLst>
+        <pc:graphicFrameChg chg="mod">
+          <ac:chgData name="Bohan, Shaun M" userId="acaa2405-47ab-4b93-95cc-c6ce05832430" providerId="ADAL" clId="{4BBDB205-D13D-4AF8-B43D-116461632D03}" dt="2023-12-12T18:18:01.774" v="4" actId="20577"/>
+          <ac:graphicFrameMkLst>
+            <pc:docMk/>
+            <pc:sldMk cId="2176736048" sldId="262"/>
+            <ac:graphicFrameMk id="36" creationId="{ACA55F82-A3C1-EEC9-B5E8-C50E75E88F6F}"/>
+          </ac:graphicFrameMkLst>
+        </pc:graphicFrameChg>
       </pc:sldChg>
     </pc:docChg>
   </pc:docChgLst>
@@ -2849,7 +2919,7 @@
             <a:defRPr cap="all"/>
           </a:pPr>
           <a:r>
-            <a:rPr lang="en-US"/>
+            <a:rPr lang="en-US" dirty="0"/>
             <a:t>Order of the books changes based on user interaction</a:t>
           </a:r>
         </a:p>
@@ -3446,8 +3516,8 @@
         <a:lstStyle/>
         <a:p>
           <a:r>
-            <a:rPr lang="en-US"/>
-            <a:t>Also used it for viewing details of an individual book</a:t>
+            <a:rPr lang="en-US" dirty="0"/>
+            <a:t>Also used for viewing details of an individual book</a:t>
           </a:r>
         </a:p>
       </dgm:t>
@@ -3979,7 +4049,7 @@
             <a:defRPr cap="all"/>
           </a:pPr>
           <a:r>
-            <a:rPr lang="en-US" sz="1500" kern="1200"/>
+            <a:rPr lang="en-US" sz="1500" kern="1200" dirty="0"/>
             <a:t>Order of the books changes based on user interaction</a:t>
           </a:r>
         </a:p>
@@ -4906,8 +4976,8 @@
             <a:buNone/>
           </a:pPr>
           <a:r>
-            <a:rPr lang="en-US" sz="2500" kern="1200"/>
-            <a:t>Also used it for viewing details of an individual book</a:t>
+            <a:rPr lang="en-US" sz="2500" kern="1200" dirty="0"/>
+            <a:t>Also used for viewing details of an individual book</a:t>
           </a:r>
         </a:p>
       </dsp:txBody>
@@ -7656,7 +7726,7 @@
           <a:p>
             <a:fld id="{4B87CDED-3347-4317-AC0A-27852BE0EAFE}" type="datetimeFigureOut">
               <a:rPr lang="en-US" smtClean="0"/>
-              <a:t>12/11/2023</a:t>
+              <a:t>12/12/2023</a:t>
             </a:fld>
             <a:endParaRPr lang="en-US"/>
           </a:p>
@@ -7854,7 +7924,7 @@
           <a:p>
             <a:fld id="{4B87CDED-3347-4317-AC0A-27852BE0EAFE}" type="datetimeFigureOut">
               <a:rPr lang="en-US" smtClean="0"/>
-              <a:t>12/11/2023</a:t>
+              <a:t>12/12/2023</a:t>
             </a:fld>
             <a:endParaRPr lang="en-US"/>
           </a:p>
@@ -8062,7 +8132,7 @@
           <a:p>
             <a:fld id="{4B87CDED-3347-4317-AC0A-27852BE0EAFE}" type="datetimeFigureOut">
               <a:rPr lang="en-US" smtClean="0"/>
-              <a:t>12/11/2023</a:t>
+              <a:t>12/12/2023</a:t>
             </a:fld>
             <a:endParaRPr lang="en-US"/>
           </a:p>
@@ -8260,7 +8330,7 @@
           <a:p>
             <a:fld id="{4B87CDED-3347-4317-AC0A-27852BE0EAFE}" type="datetimeFigureOut">
               <a:rPr lang="en-US" smtClean="0"/>
-              <a:t>12/11/2023</a:t>
+              <a:t>12/12/2023</a:t>
             </a:fld>
             <a:endParaRPr lang="en-US"/>
           </a:p>
@@ -8535,7 +8605,7 @@
           <a:p>
             <a:fld id="{4B87CDED-3347-4317-AC0A-27852BE0EAFE}" type="datetimeFigureOut">
               <a:rPr lang="en-US" smtClean="0"/>
-              <a:t>12/11/2023</a:t>
+              <a:t>12/12/2023</a:t>
             </a:fld>
             <a:endParaRPr lang="en-US"/>
           </a:p>
@@ -8800,7 +8870,7 @@
           <a:p>
             <a:fld id="{4B87CDED-3347-4317-AC0A-27852BE0EAFE}" type="datetimeFigureOut">
               <a:rPr lang="en-US" smtClean="0"/>
-              <a:t>12/11/2023</a:t>
+              <a:t>12/12/2023</a:t>
             </a:fld>
             <a:endParaRPr lang="en-US"/>
           </a:p>
@@ -9212,7 +9282,7 @@
           <a:p>
             <a:fld id="{4B87CDED-3347-4317-AC0A-27852BE0EAFE}" type="datetimeFigureOut">
               <a:rPr lang="en-US" smtClean="0"/>
-              <a:t>12/11/2023</a:t>
+              <a:t>12/12/2023</a:t>
             </a:fld>
             <a:endParaRPr lang="en-US"/>
           </a:p>
@@ -9353,7 +9423,7 @@
           <a:p>
             <a:fld id="{4B87CDED-3347-4317-AC0A-27852BE0EAFE}" type="datetimeFigureOut">
               <a:rPr lang="en-US" smtClean="0"/>
-              <a:t>12/11/2023</a:t>
+              <a:t>12/12/2023</a:t>
             </a:fld>
             <a:endParaRPr lang="en-US"/>
           </a:p>
@@ -9466,7 +9536,7 @@
           <a:p>
             <a:fld id="{4B87CDED-3347-4317-AC0A-27852BE0EAFE}" type="datetimeFigureOut">
               <a:rPr lang="en-US" smtClean="0"/>
-              <a:t>12/11/2023</a:t>
+              <a:t>12/12/2023</a:t>
             </a:fld>
             <a:endParaRPr lang="en-US"/>
           </a:p>
@@ -9777,7 +9847,7 @@
           <a:p>
             <a:fld id="{4B87CDED-3347-4317-AC0A-27852BE0EAFE}" type="datetimeFigureOut">
               <a:rPr lang="en-US" smtClean="0"/>
-              <a:t>12/11/2023</a:t>
+              <a:t>12/12/2023</a:t>
             </a:fld>
             <a:endParaRPr lang="en-US"/>
           </a:p>
@@ -10065,7 +10135,7 @@
           <a:p>
             <a:fld id="{4B87CDED-3347-4317-AC0A-27852BE0EAFE}" type="datetimeFigureOut">
               <a:rPr lang="en-US" smtClean="0"/>
-              <a:t>12/11/2023</a:t>
+              <a:t>12/12/2023</a:t>
             </a:fld>
             <a:endParaRPr lang="en-US"/>
           </a:p>
@@ -10306,7 +10376,7 @@
           <a:p>
             <a:fld id="{4B87CDED-3347-4317-AC0A-27852BE0EAFE}" type="datetimeFigureOut">
               <a:rPr lang="en-US" smtClean="0"/>
-              <a:t>12/11/2023</a:t>
+              <a:t>12/12/2023</a:t>
             </a:fld>
             <a:endParaRPr lang="en-US"/>
           </a:p>
@@ -10924,50 +10994,13 @@
           <a:p>
             <a:pPr algn="l"/>
             <a:r>
-              <a:rPr lang="en-US" sz="8000">
+              <a:rPr lang="en-US" sz="8000" dirty="0">
                 <a:solidFill>
                   <a:schemeClr val="tx2"/>
                 </a:solidFill>
               </a:rPr>
               <a:t>MySoftwareBookList</a:t>
             </a:r>
-          </a:p>
-        </p:txBody>
-      </p:sp>
-      <p:sp>
-        <p:nvSpPr>
-          <p:cNvPr id="3" name="Subtitle 2">
-            <a:extLst>
-              <a:ext uri="{FF2B5EF4-FFF2-40B4-BE49-F238E27FC236}">
-                <a16:creationId xmlns:a16="http://schemas.microsoft.com/office/drawing/2014/main" id="{FA072AE6-A858-CD25-3EBF-D661A4880DA4}"/>
-              </a:ext>
-            </a:extLst>
-          </p:cNvPr>
-          <p:cNvSpPr>
-            <a:spLocks noGrp="1"/>
-          </p:cNvSpPr>
-          <p:nvPr>
-            <p:ph type="subTitle" idx="1"/>
-          </p:nvPr>
-        </p:nvSpPr>
-        <p:spPr>
-          <a:xfrm>
-            <a:off x="732567" y="4067745"/>
-            <a:ext cx="10530318" cy="1949813"/>
-          </a:xfrm>
-        </p:spPr>
-        <p:txBody>
-          <a:bodyPr anchor="t">
-            <a:normAutofit/>
-          </a:bodyPr>
-          <a:lstStyle/>
-          <a:p>
-            <a:pPr algn="l"/>
-            <a:endParaRPr lang="en-US" sz="2200">
-              <a:solidFill>
-                <a:schemeClr val="tx2"/>
-              </a:solidFill>
-            </a:endParaRPr>
           </a:p>
         </p:txBody>
       </p:sp>
@@ -13981,7 +14014,7 @@
             <p:ph idx="1"/>
             <p:extLst>
               <p:ext uri="{D42A27DB-BD31-4B8C-83A1-F6EECF244321}">
-                <p14:modId xmlns:p14="http://schemas.microsoft.com/office/powerpoint/2010/main" val="1721430609"/>
+                <p14:modId xmlns:p14="http://schemas.microsoft.com/office/powerpoint/2010/main" val="2007281872"/>
               </p:ext>
             </p:extLst>
           </p:nvPr>
@@ -14990,7 +15023,7 @@
             <p:ph idx="1"/>
             <p:extLst>
               <p:ext uri="{D42A27DB-BD31-4B8C-83A1-F6EECF244321}">
-                <p14:modId xmlns:p14="http://schemas.microsoft.com/office/powerpoint/2010/main" val="667613217"/>
+                <p14:modId xmlns:p14="http://schemas.microsoft.com/office/powerpoint/2010/main" val="1347903036"/>
               </p:ext>
             </p:extLst>
           </p:nvPr>
@@ -15060,31 +15093,6 @@
               <a:rPr lang="en-US" dirty="0"/>
               <a:t>Demo</a:t>
             </a:r>
-          </a:p>
-        </p:txBody>
-      </p:sp>
-      <p:sp>
-        <p:nvSpPr>
-          <p:cNvPr id="3" name="Content Placeholder 2">
-            <a:extLst>
-              <a:ext uri="{FF2B5EF4-FFF2-40B4-BE49-F238E27FC236}">
-                <a16:creationId xmlns:a16="http://schemas.microsoft.com/office/drawing/2014/main" id="{5BEC3A34-AAE7-F054-90D9-ECD1DACB384C}"/>
-              </a:ext>
-            </a:extLst>
-          </p:cNvPr>
-          <p:cNvSpPr>
-            <a:spLocks noGrp="1"/>
-          </p:cNvSpPr>
-          <p:nvPr>
-            <p:ph idx="1"/>
-          </p:nvPr>
-        </p:nvSpPr>
-        <p:spPr/>
-        <p:txBody>
-          <a:bodyPr/>
-          <a:lstStyle/>
-          <a:p>
-            <a:endParaRPr lang="en-US"/>
           </a:p>
         </p:txBody>
       </p:sp>

</xml_diff>